<commit_message>
Factors Afecting House Prices in Houston
</commit_message>
<xml_diff>
--- a/Presentation_Project1_Group4_HousingMaster.pptx
+++ b/Presentation_Project1_Group4_HousingMaster.pptx
@@ -243,7 +243,7 @@
           <a:p>
             <a:fld id="{72C99A15-3476-446E-89B2-DDD3A7FFEDA0}" type="datetimeFigureOut">
               <a:rPr lang="en-US" smtClean="0"/>
-              <a:t>09/11/2019</a:t>
+              <a:t>05/28/2020</a:t>
             </a:fld>
             <a:endParaRPr lang="en-US"/>
           </a:p>
@@ -813,7 +813,7 @@
             <a:fld id="{53074F12-AA26-4AC8-9962-C36BB8F32554}" type="datetimeFigureOut">
               <a:rPr lang="en-US" smtClean="0"/>
               <a:pPr/>
-              <a:t>09/11/2019</a:t>
+              <a:t>05/28/2020</a:t>
             </a:fld>
             <a:endParaRPr lang="en-US"/>
           </a:p>
@@ -1067,7 +1067,7 @@
             <a:fld id="{53074F12-AA26-4AC8-9962-C36BB8F32554}" type="datetimeFigureOut">
               <a:rPr lang="en-US" smtClean="0"/>
               <a:pPr/>
-              <a:t>09/11/2019</a:t>
+              <a:t>05/28/2020</a:t>
             </a:fld>
             <a:endParaRPr lang="en-US"/>
           </a:p>
@@ -1237,7 +1237,7 @@
             <a:fld id="{53074F12-AA26-4AC8-9962-C36BB8F32554}" type="datetimeFigureOut">
               <a:rPr lang="en-US" smtClean="0"/>
               <a:pPr/>
-              <a:t>09/11/2019</a:t>
+              <a:t>05/28/2020</a:t>
             </a:fld>
             <a:endParaRPr lang="en-US"/>
           </a:p>
@@ -1417,7 +1417,7 @@
             <a:fld id="{53074F12-AA26-4AC8-9962-C36BB8F32554}" type="datetimeFigureOut">
               <a:rPr lang="en-US" smtClean="0"/>
               <a:pPr/>
-              <a:t>09/11/2019</a:t>
+              <a:t>05/28/2020</a:t>
             </a:fld>
             <a:endParaRPr lang="en-US"/>
           </a:p>
@@ -1693,7 +1693,7 @@
             <a:fld id="{53074F12-AA26-4AC8-9962-C36BB8F32554}" type="datetimeFigureOut">
               <a:rPr lang="en-US" smtClean="0"/>
               <a:pPr/>
-              <a:t>09/11/2019</a:t>
+              <a:t>05/28/2020</a:t>
             </a:fld>
             <a:endParaRPr lang="en-US"/>
           </a:p>
@@ -1942,7 +1942,7 @@
             <a:fld id="{53074F12-AA26-4AC8-9962-C36BB8F32554}" type="datetimeFigureOut">
               <a:rPr lang="en-US" smtClean="0"/>
               <a:pPr/>
-              <a:t>09/11/2019</a:t>
+              <a:t>05/28/2020</a:t>
             </a:fld>
             <a:endParaRPr lang="en-US"/>
           </a:p>
@@ -2189,7 +2189,7 @@
             <a:fld id="{53074F12-AA26-4AC8-9962-C36BB8F32554}" type="datetimeFigureOut">
               <a:rPr lang="en-US" smtClean="0"/>
               <a:pPr/>
-              <a:t>09/11/2019</a:t>
+              <a:t>05/28/2020</a:t>
             </a:fld>
             <a:endParaRPr lang="en-US"/>
           </a:p>
@@ -2476,7 +2476,7 @@
             <a:fld id="{53074F12-AA26-4AC8-9962-C36BB8F32554}" type="datetimeFigureOut">
               <a:rPr lang="en-US" smtClean="0"/>
               <a:pPr/>
-              <a:t>09/11/2019</a:t>
+              <a:t>05/28/2020</a:t>
             </a:fld>
             <a:endParaRPr lang="en-US"/>
           </a:p>
@@ -2963,7 +2963,7 @@
             <a:fld id="{53074F12-AA26-4AC8-9962-C36BB8F32554}" type="datetimeFigureOut">
               <a:rPr lang="en-US" smtClean="0"/>
               <a:pPr/>
-              <a:t>09/11/2019</a:t>
+              <a:t>05/28/2020</a:t>
             </a:fld>
             <a:endParaRPr lang="en-US"/>
           </a:p>
@@ -3082,7 +3082,7 @@
             <a:fld id="{53074F12-AA26-4AC8-9962-C36BB8F32554}" type="datetimeFigureOut">
               <a:rPr lang="en-US" smtClean="0"/>
               <a:pPr/>
-              <a:t>09/11/2019</a:t>
+              <a:t>05/28/2020</a:t>
             </a:fld>
             <a:endParaRPr lang="en-US"/>
           </a:p>
@@ -3179,7 +3179,7 @@
             <a:fld id="{53074F12-AA26-4AC8-9962-C36BB8F32554}" type="datetimeFigureOut">
               <a:rPr lang="en-US" smtClean="0"/>
               <a:pPr/>
-              <a:t>09/11/2019</a:t>
+              <a:t>05/28/2020</a:t>
             </a:fld>
             <a:endParaRPr lang="en-US"/>
           </a:p>
@@ -3456,7 +3456,7 @@
             <a:fld id="{53074F12-AA26-4AC8-9962-C36BB8F32554}" type="datetimeFigureOut">
               <a:rPr lang="en-US" smtClean="0"/>
               <a:pPr/>
-              <a:t>09/11/2019</a:t>
+              <a:t>05/28/2020</a:t>
             </a:fld>
             <a:endParaRPr lang="en-US"/>
           </a:p>
@@ -3678,7 +3678,7 @@
             <a:fld id="{53074F12-AA26-4AC8-9962-C36BB8F32554}" type="datetimeFigureOut">
               <a:rPr lang="en-US" smtClean="0"/>
               <a:pPr/>
-              <a:t>09/11/2019</a:t>
+              <a:t>05/28/2020</a:t>
             </a:fld>
             <a:endParaRPr lang="en-US"/>
           </a:p>

</xml_diff>

<commit_message>
Factors affecting house values in Houston
</commit_message>
<xml_diff>
--- a/Presentation_Project1_Group4_HousingMaster.pptx
+++ b/Presentation_Project1_Group4_HousingMaster.pptx
@@ -4067,7 +4067,7 @@
         </p:nvSpPr>
         <p:spPr>
           <a:xfrm>
-            <a:off x="-467264" y="-24234"/>
+            <a:off x="-479398" y="128471"/>
             <a:ext cx="10231234" cy="2443279"/>
           </a:xfrm>
         </p:spPr>
@@ -4079,21 +4079,71 @@
           <a:p>
             <a:pPr algn="ctr"/>
             <a:r>
-              <a:rPr lang="en-US" sz="3000" dirty="0"/>
-              <a:t>Factors affecting House Values in Houston Area</a:t>
+              <a:rPr lang="en-US" sz="3300" b="1" dirty="0">
+                <a:effectLst>
+                  <a:outerShdw blurRad="38100" dist="38100" dir="2700000" algn="tl">
+                    <a:srgbClr val="000000">
+                      <a:alpha val="43137"/>
+                    </a:srgbClr>
+                  </a:outerShdw>
+                </a:effectLst>
+                <a:latin typeface="Batang" panose="02030600000101010101" pitchFamily="18" charset="-127"/>
+                <a:ea typeface="Batang" panose="02030600000101010101" pitchFamily="18" charset="-127"/>
+              </a:rPr>
+              <a:t>Factors Affecting House Values</a:t>
             </a:r>
             <a:br>
-              <a:rPr lang="en-US" sz="3000" dirty="0"/>
+              <a:rPr lang="en-US" sz="3300" b="1" dirty="0">
+                <a:effectLst>
+                  <a:outerShdw blurRad="38100" dist="38100" dir="2700000" algn="tl">
+                    <a:srgbClr val="000000">
+                      <a:alpha val="43137"/>
+                    </a:srgbClr>
+                  </a:outerShdw>
+                </a:effectLst>
+                <a:latin typeface="Batang" panose="02030600000101010101" pitchFamily="18" charset="-127"/>
+                <a:ea typeface="Batang" panose="02030600000101010101" pitchFamily="18" charset="-127"/>
+              </a:rPr>
             </a:br>
             <a:r>
-              <a:rPr lang="en-US" sz="3000" dirty="0"/>
-              <a:t>Harris County</a:t>
+              <a:rPr lang="en-US" sz="3300" b="1" dirty="0">
+                <a:effectLst>
+                  <a:outerShdw blurRad="38100" dist="38100" dir="2700000" algn="tl">
+                    <a:srgbClr val="000000">
+                      <a:alpha val="43137"/>
+                    </a:srgbClr>
+                  </a:outerShdw>
+                </a:effectLst>
+                <a:latin typeface="Batang" panose="02030600000101010101" pitchFamily="18" charset="-127"/>
+                <a:ea typeface="Batang" panose="02030600000101010101" pitchFamily="18" charset="-127"/>
+              </a:rPr>
+              <a:t>Houston Area</a:t>
             </a:r>
             <a:br>
-              <a:rPr lang="en-US" sz="3000" dirty="0"/>
+              <a:rPr lang="en-US" sz="3300" b="1" dirty="0">
+                <a:effectLst>
+                  <a:outerShdw blurRad="38100" dist="38100" dir="2700000" algn="tl">
+                    <a:srgbClr val="000000">
+                      <a:alpha val="43137"/>
+                    </a:srgbClr>
+                  </a:outerShdw>
+                </a:effectLst>
+                <a:latin typeface="Batang" panose="02030600000101010101" pitchFamily="18" charset="-127"/>
+                <a:ea typeface="Batang" panose="02030600000101010101" pitchFamily="18" charset="-127"/>
+              </a:rPr>
             </a:br>
             <a:r>
-              <a:rPr lang="en-US" sz="3000" dirty="0"/>
+              <a:rPr lang="en-US" sz="3300" b="1" dirty="0">
+                <a:effectLst>
+                  <a:outerShdw blurRad="38100" dist="38100" dir="2700000" algn="tl">
+                    <a:srgbClr val="000000">
+                      <a:alpha val="43137"/>
+                    </a:srgbClr>
+                  </a:outerShdw>
+                </a:effectLst>
+                <a:latin typeface="Batang" panose="02030600000101010101" pitchFamily="18" charset="-127"/>
+                <a:ea typeface="Batang" panose="02030600000101010101" pitchFamily="18" charset="-127"/>
+              </a:rPr>
               <a:t>from 2011 to 2017</a:t>
             </a:r>
           </a:p>
@@ -4111,8 +4161,8 @@
         </p:nvSpPr>
         <p:spPr>
           <a:xfrm>
-            <a:off x="2586835" y="2113635"/>
-            <a:ext cx="6413610" cy="2535796"/>
+            <a:off x="143555" y="2419045"/>
+            <a:ext cx="8856890" cy="2230386"/>
           </a:xfrm>
         </p:spPr>
         <p:txBody>
@@ -4121,9 +4171,13 @@
           </a:bodyPr>
           <a:lstStyle/>
           <a:p>
-            <a:r>
-              <a:rPr lang="en-US" dirty="0"/>
-              <a:t>By Group 4: Housing Masters</a:t>
+            <a:pPr algn="ctr"/>
+            <a:r>
+              <a:rPr lang="en-US" sz="3000" b="1" dirty="0">
+                <a:latin typeface="Batang" panose="02030600000101010101" pitchFamily="18" charset="-127"/>
+                <a:ea typeface="Batang" panose="02030600000101010101" pitchFamily="18" charset="-127"/>
+              </a:rPr>
+              <a:t>Project Team: Housing Masters</a:t>
             </a:r>
           </a:p>
         </p:txBody>
@@ -4142,8 +4196,8 @@
         </p:nvSpPr>
         <p:spPr>
           <a:xfrm>
-            <a:off x="-9150" y="4862325"/>
-            <a:ext cx="4820457" cy="369332"/>
+            <a:off x="3121302" y="4280008"/>
+            <a:ext cx="2901395" cy="323165"/>
           </a:xfrm>
           <a:prstGeom prst="rect">
             <a:avLst/>
@@ -4157,7 +4211,10 @@
           <a:lstStyle/>
           <a:p>
             <a:r>
-              <a:rPr lang="en-US" dirty="0"/>
+              <a:rPr lang="en-US" sz="1500" b="1" dirty="0">
+                <a:latin typeface="Batang" panose="02030600000101010101" pitchFamily="18" charset="-127"/>
+                <a:ea typeface="Batang" panose="02030600000101010101" pitchFamily="18" charset="-127"/>
+              </a:rPr>
               <a:t>Houston, September 11, 2019</a:t>
             </a:r>
           </a:p>
@@ -4177,8 +4234,8 @@
         </p:nvSpPr>
         <p:spPr>
           <a:xfrm>
-            <a:off x="6099050" y="2722598"/>
-            <a:ext cx="3817625" cy="1908215"/>
+            <a:off x="64219" y="3079587"/>
+            <a:ext cx="9144001" cy="1477328"/>
           </a:xfrm>
           <a:prstGeom prst="rect">
             <a:avLst/>
@@ -4191,105 +4248,182 @@
           </a:bodyPr>
           <a:lstStyle/>
           <a:p>
-            <a:pPr marL="457200" indent="-457200">
-              <a:buFont typeface="Arial" panose="020B0604020202020204" pitchFamily="34" charset="0"/>
-              <a:buChar char="•"/>
-            </a:pPr>
-            <a:r>
-              <a:rPr lang="en-US" sz="2500" dirty="0">
+            <a:pPr algn="just"/>
+            <a:r>
+              <a:rPr lang="en-US" sz="3000" b="1" dirty="0">
+                <a:solidFill>
+                  <a:srgbClr val="002060"/>
+                </a:solidFill>
+                <a:latin typeface="Batang" panose="02030600000101010101" pitchFamily="18" charset="-127"/>
+                <a:ea typeface="Batang" panose="02030600000101010101" pitchFamily="18" charset="-127"/>
+              </a:rPr>
+              <a:t>      </a:t>
+            </a:r>
+            <a:r>
+              <a:rPr lang="en-US" sz="2800" b="1" dirty="0">
+                <a:solidFill>
+                  <a:srgbClr val="002060"/>
+                </a:solidFill>
+                <a:effectLst>
+                  <a:outerShdw blurRad="38100" dist="38100" dir="2700000" algn="tl">
+                    <a:srgbClr val="000000">
+                      <a:alpha val="43137"/>
+                    </a:srgbClr>
+                  </a:outerShdw>
+                </a:effectLst>
                 <a:highlight>
-                  <a:srgbClr val="C0C0C0"/>
+                  <a:srgbClr val="FF9900"/>
                 </a:highlight>
+                <a:latin typeface="Batang" panose="02030600000101010101" pitchFamily="18" charset="-127"/>
+                <a:ea typeface="Batang" panose="02030600000101010101" pitchFamily="18" charset="-127"/>
               </a:rPr>
               <a:t>Eva </a:t>
             </a:r>
             <a:r>
-              <a:rPr lang="en-US" sz="2500" dirty="0" err="1">
+              <a:rPr lang="en-US" sz="2800" b="1" dirty="0" err="1">
+                <a:solidFill>
+                  <a:srgbClr val="002060"/>
+                </a:solidFill>
+                <a:effectLst>
+                  <a:outerShdw blurRad="38100" dist="38100" dir="2700000" algn="tl">
+                    <a:srgbClr val="000000">
+                      <a:alpha val="43137"/>
+                    </a:srgbClr>
+                  </a:outerShdw>
+                </a:effectLst>
                 <a:highlight>
-                  <a:srgbClr val="C0C0C0"/>
+                  <a:srgbClr val="FF9900"/>
                 </a:highlight>
+                <a:latin typeface="Batang" panose="02030600000101010101" pitchFamily="18" charset="-127"/>
+                <a:ea typeface="Batang" panose="02030600000101010101" pitchFamily="18" charset="-127"/>
               </a:rPr>
               <a:t>Okhankhuele</a:t>
             </a:r>
-            <a:endParaRPr lang="en-US" sz="2500" dirty="0">
-              <a:highlight>
-                <a:srgbClr val="C0C0C0"/>
-              </a:highlight>
-            </a:endParaRPr>
-          </a:p>
-          <a:p>
-            <a:pPr marL="457200" indent="-457200">
-              <a:buFont typeface="Arial" panose="020B0604020202020204" pitchFamily="34" charset="0"/>
-              <a:buChar char="•"/>
-            </a:pPr>
-            <a:r>
-              <a:rPr lang="en-US" sz="2500" dirty="0">
+            <a:r>
+              <a:rPr lang="en-US" sz="2800" b="1" dirty="0">
+                <a:solidFill>
+                  <a:srgbClr val="002060"/>
+                </a:solidFill>
+                <a:effectLst>
+                  <a:outerShdw blurRad="38100" dist="38100" dir="2700000" algn="tl">
+                    <a:srgbClr val="000000">
+                      <a:alpha val="43137"/>
+                    </a:srgbClr>
+                  </a:outerShdw>
+                </a:effectLst>
                 <a:highlight>
-                  <a:srgbClr val="C0C0C0"/>
+                  <a:srgbClr val="FF9900"/>
                 </a:highlight>
+                <a:latin typeface="Batang" panose="02030600000101010101" pitchFamily="18" charset="-127"/>
+                <a:ea typeface="Batang" panose="02030600000101010101" pitchFamily="18" charset="-127"/>
+              </a:rPr>
+              <a:t>           Suleyman Incekara</a:t>
+            </a:r>
+          </a:p>
+          <a:p>
+            <a:pPr algn="just"/>
+            <a:r>
+              <a:rPr lang="en-US" sz="3000" b="1" dirty="0">
+                <a:solidFill>
+                  <a:srgbClr val="002060"/>
+                </a:solidFill>
+                <a:effectLst>
+                  <a:outerShdw blurRad="38100" dist="38100" dir="2700000" algn="tl">
+                    <a:srgbClr val="000000">
+                      <a:alpha val="43137"/>
+                    </a:srgbClr>
+                  </a:outerShdw>
+                </a:effectLst>
+                <a:latin typeface="Batang" panose="02030600000101010101" pitchFamily="18" charset="-127"/>
+                <a:ea typeface="Batang" panose="02030600000101010101" pitchFamily="18" charset="-127"/>
+              </a:rPr>
+              <a:t>           </a:t>
+            </a:r>
+            <a:r>
+              <a:rPr lang="en-US" sz="2800" b="1" dirty="0">
+                <a:solidFill>
+                  <a:srgbClr val="002060"/>
+                </a:solidFill>
+                <a:effectLst>
+                  <a:outerShdw blurRad="38100" dist="38100" dir="2700000" algn="tl">
+                    <a:srgbClr val="000000">
+                      <a:alpha val="43137"/>
+                    </a:srgbClr>
+                  </a:outerShdw>
+                </a:effectLst>
+                <a:highlight>
+                  <a:srgbClr val="FF9900"/>
+                </a:highlight>
+                <a:latin typeface="Batang" panose="02030600000101010101" pitchFamily="18" charset="-127"/>
+                <a:ea typeface="Batang" panose="02030600000101010101" pitchFamily="18" charset="-127"/>
               </a:rPr>
               <a:t>Nguyen </a:t>
             </a:r>
             <a:r>
-              <a:rPr lang="en-US" sz="2500" dirty="0" err="1">
+              <a:rPr lang="en-US" sz="2800" b="1" dirty="0" err="1">
+                <a:solidFill>
+                  <a:srgbClr val="002060"/>
+                </a:solidFill>
+                <a:effectLst>
+                  <a:outerShdw blurRad="38100" dist="38100" dir="2700000" algn="tl">
+                    <a:srgbClr val="000000">
+                      <a:alpha val="43137"/>
+                    </a:srgbClr>
+                  </a:outerShdw>
+                </a:effectLst>
                 <a:highlight>
-                  <a:srgbClr val="C0C0C0"/>
+                  <a:srgbClr val="FF9900"/>
                 </a:highlight>
+                <a:latin typeface="Batang" panose="02030600000101010101" pitchFamily="18" charset="-127"/>
+                <a:ea typeface="Batang" panose="02030600000101010101" pitchFamily="18" charset="-127"/>
               </a:rPr>
               <a:t>Nguyen</a:t>
             </a:r>
             <a:r>
-              <a:rPr lang="en-US" sz="2500" dirty="0">
+              <a:rPr lang="en-US" sz="2800" b="1" dirty="0">
+                <a:solidFill>
+                  <a:srgbClr val="002060"/>
+                </a:solidFill>
+                <a:effectLst>
+                  <a:outerShdw blurRad="38100" dist="38100" dir="2700000" algn="tl">
+                    <a:srgbClr val="000000">
+                      <a:alpha val="43137"/>
+                    </a:srgbClr>
+                  </a:outerShdw>
+                </a:effectLst>
                 <a:highlight>
-                  <a:srgbClr val="C0C0C0"/>
+                  <a:srgbClr val="FF9900"/>
                 </a:highlight>
+                <a:latin typeface="Batang" panose="02030600000101010101" pitchFamily="18" charset="-127"/>
+                <a:ea typeface="Batang" panose="02030600000101010101" pitchFamily="18" charset="-127"/>
               </a:rPr>
-              <a:t>  </a:t>
-            </a:r>
-          </a:p>
-          <a:p>
-            <a:pPr marL="457200" indent="-457200">
-              <a:buFont typeface="Arial" panose="020B0604020202020204" pitchFamily="34" charset="0"/>
-              <a:buChar char="•"/>
-            </a:pPr>
-            <a:r>
-              <a:rPr lang="en-US" sz="2500" dirty="0">
-                <a:highlight>
-                  <a:srgbClr val="C0C0C0"/>
-                </a:highlight>
+              <a:t>     Patrick Cardozo</a:t>
+            </a:r>
+            <a:r>
+              <a:rPr lang="en-US" sz="3000" b="1" dirty="0">
+                <a:solidFill>
+                  <a:srgbClr val="002060"/>
+                </a:solidFill>
+                <a:effectLst>
+                  <a:outerShdw blurRad="38100" dist="38100" dir="2700000" algn="tl">
+                    <a:srgbClr val="000000">
+                      <a:alpha val="43137"/>
+                    </a:srgbClr>
+                  </a:outerShdw>
+                </a:effectLst>
+                <a:latin typeface="Batang" panose="02030600000101010101" pitchFamily="18" charset="-127"/>
+                <a:ea typeface="Batang" panose="02030600000101010101" pitchFamily="18" charset="-127"/>
               </a:rPr>
-              <a:t>Patrick Cardozo</a:t>
-            </a:r>
-          </a:p>
-          <a:p>
-            <a:pPr marL="457200" indent="-457200">
-              <a:buFont typeface="Arial" panose="020B0604020202020204" pitchFamily="34" charset="0"/>
-              <a:buChar char="•"/>
-            </a:pPr>
-            <a:r>
-              <a:rPr lang="en-US" sz="2500" dirty="0">
-                <a:highlight>
-                  <a:srgbClr val="C0C0C0"/>
-                </a:highlight>
-              </a:rPr>
-              <a:t>Suleyman </a:t>
-            </a:r>
-            <a:r>
-              <a:rPr lang="en-US" sz="2500" dirty="0" err="1">
-                <a:highlight>
-                  <a:srgbClr val="C0C0C0"/>
-                </a:highlight>
-              </a:rPr>
-              <a:t>Incekara</a:t>
-            </a:r>
-            <a:endParaRPr lang="en-US" sz="2500" dirty="0">
-              <a:highlight>
-                <a:srgbClr val="C0C0C0"/>
-              </a:highlight>
+              <a:t>        </a:t>
+            </a:r>
+          </a:p>
+          <a:p>
+            <a:pPr algn="ctr"/>
+            <a:endParaRPr lang="en-US" sz="3000" b="1" dirty="0">
+              <a:solidFill>
+                <a:srgbClr val="002060"/>
+              </a:solidFill>
             </a:endParaRPr>
-          </a:p>
-          <a:p>
-            <a:endParaRPr lang="en-US" dirty="0"/>
           </a:p>
         </p:txBody>
       </p:sp>

</xml_diff>